<commit_message>
Fixes and TODOs for charts and layout of cells and data slides
</commit_message>
<xml_diff>
--- a/Courses/Computer-Modeling-and-IT/Computer-Modeling-and-IT-5-Class/29-Charts-and-Layout-of-Cells-and-Data/29-Charts-and-Layout-of-Cells-and-Data.pptx
+++ b/Courses/Computer-Modeling-and-IT/Computer-Modeling-and-IT-5-Class/29-Charts-and-Layout-of-Cells-and-Data/29-Charts-and-Layout-of-Cells-and-Data.pptx
@@ -204,7 +204,7 @@
 <file path=ppt/charts/chart1.xml><?xml version="1.0" encoding="utf-8"?>
 <c:chartSpace xmlns:c="http://schemas.openxmlformats.org/drawingml/2006/chart" xmlns:a="http://schemas.openxmlformats.org/drawingml/2006/main" xmlns:r="http://schemas.openxmlformats.org/officeDocument/2006/relationships" xmlns:c16r2="http://schemas.microsoft.com/office/drawing/2015/06/chart">
   <c:date1904 val="0"/>
-  <c:lang val="en-US"/>
+  <c:lang val="en-GB"/>
   <c:roundedCorners val="0"/>
   <mc:AlternateContent xmlns:mc="http://schemas.openxmlformats.org/markup-compatibility/2006">
     <mc:Choice xmlns:c14="http://schemas.microsoft.com/office/drawing/2007/8/2/chart" Requires="c14">
@@ -271,7 +271,7 @@
               <a:cs typeface="+mn-cs"/>
             </a:defRPr>
           </a:pPr>
-          <a:endParaRPr lang="en-US"/>
+          <a:endParaRPr lang="en-BG"/>
         </a:p>
       </c:txPr>
     </c:title>
@@ -539,7 +539,7 @@
                 <a:cs typeface="+mn-cs"/>
               </a:defRPr>
             </a:pPr>
-            <a:endParaRPr lang="en-US"/>
+            <a:endParaRPr lang="en-BG"/>
           </a:p>
         </c:txPr>
         <c:crossAx val="712969231"/>
@@ -598,7 +598,7 @@
                 <a:cs typeface="+mn-cs"/>
               </a:defRPr>
             </a:pPr>
-            <a:endParaRPr lang="en-US"/>
+            <a:endParaRPr lang="en-BG"/>
           </a:p>
         </c:txPr>
         <c:crossAx val="713053791"/>
@@ -640,7 +640,7 @@
               <a:cs typeface="+mn-cs"/>
             </a:defRPr>
           </a:pPr>
-          <a:endParaRPr lang="en-US"/>
+          <a:endParaRPr lang="en-BG"/>
         </a:p>
       </c:txPr>
     </c:legend>
@@ -662,7 +662,7 @@
       <a:pPr>
         <a:defRPr/>
       </a:pPr>
-      <a:endParaRPr lang="en-US"/>
+      <a:endParaRPr lang="en-BG"/>
     </a:p>
   </c:txPr>
   <c:externalData r:id="rId3">
@@ -674,7 +674,7 @@
 <file path=ppt/charts/chart2.xml><?xml version="1.0" encoding="utf-8"?>
 <c:chartSpace xmlns:c="http://schemas.openxmlformats.org/drawingml/2006/chart" xmlns:a="http://schemas.openxmlformats.org/drawingml/2006/main" xmlns:r="http://schemas.openxmlformats.org/officeDocument/2006/relationships" xmlns:c16r2="http://schemas.microsoft.com/office/drawing/2015/06/chart">
   <c:date1904 val="0"/>
-  <c:lang val="en-US"/>
+  <c:lang val="en-GB"/>
   <c:roundedCorners val="0"/>
   <mc:AlternateContent xmlns:mc="http://schemas.openxmlformats.org/markup-compatibility/2006">
     <mc:Choice xmlns:c14="http://schemas.microsoft.com/office/drawing/2007/8/2/chart" Requires="c14">
@@ -737,7 +737,7 @@
               <a:cs typeface="+mn-cs"/>
             </a:defRPr>
           </a:pPr>
-          <a:endParaRPr lang="en-US"/>
+          <a:endParaRPr lang="en-BG"/>
         </a:p>
       </c:txPr>
     </c:title>
@@ -1110,7 +1110,7 @@
                 <a:cs typeface="+mn-cs"/>
               </a:defRPr>
             </a:pPr>
-            <a:endParaRPr lang="en-US"/>
+            <a:endParaRPr lang="en-BG"/>
           </a:p>
         </c:txPr>
         <c:crossAx val="-1703236784"/>
@@ -1169,7 +1169,7 @@
                 <a:cs typeface="+mn-cs"/>
               </a:defRPr>
             </a:pPr>
-            <a:endParaRPr lang="en-US"/>
+            <a:endParaRPr lang="en-BG"/>
           </a:p>
         </c:txPr>
         <c:crossAx val="-1703240592"/>
@@ -1211,7 +1211,7 @@
               <a:cs typeface="+mn-cs"/>
             </a:defRPr>
           </a:pPr>
-          <a:endParaRPr lang="en-US"/>
+          <a:endParaRPr lang="en-BG"/>
         </a:p>
       </c:txPr>
     </c:legend>
@@ -1233,7 +1233,7 @@
       <a:pPr>
         <a:defRPr/>
       </a:pPr>
-      <a:endParaRPr lang="en-US"/>
+      <a:endParaRPr lang="en-BG"/>
     </a:p>
   </c:txPr>
   <c:externalData r:id="rId3">
@@ -2422,7 +2422,7 @@
           <a:p>
             <a:fld id="{4E087215-0C8F-4762-A664-737A353EC9A4}" type="datetimeFigureOut">
               <a:rPr lang="bg-BG" smtClean="0"/>
-              <a:t>11.10.2023 г.</a:t>
+              <a:t>16.10.23 г.</a:t>
             </a:fld>
             <a:endParaRPr lang="bg-BG"/>
           </a:p>
@@ -2618,7 +2618,7 @@
           <a:p>
             <a:fld id="{72D84649-876A-46C9-8472-14CB09C070D8}" type="datetimeFigureOut">
               <a:rPr lang="en-US" smtClean="0"/>
-              <a:t>10/11/2023</a:t>
+              <a:t>10/16/23</a:t>
             </a:fld>
             <a:endParaRPr lang="en-US"/>
           </a:p>
@@ -3375,19 +3375,19 @@
           <a:lstStyle/>
           <a:p>
             <a:r>
-              <a:rPr lang="bg-BG" sz="1100" smtClean="0"/>
+              <a:rPr lang="bg-BG" sz="1100"/>
               <a:t>Работна група </a:t>
             </a:r>
             <a:r>
-              <a:rPr lang="bg-BG" smtClean="0"/>
+              <a:rPr lang="bg-BG"/>
               <a:t>"Образование по програмиране и ИТ"</a:t>
             </a:r>
             <a:r>
-              <a:rPr lang="bg-BG" sz="1100" smtClean="0"/>
+              <a:rPr lang="bg-BG" sz="1100"/>
               <a:t>, с подкрепата на </a:t>
             </a:r>
             <a:r>
-              <a:rPr lang="en-US" sz="1100" smtClean="0">
+              <a:rPr lang="en-US" sz="1100">
                 <a:hlinkClick r:id="rId3"/>
               </a:rPr>
               <a:t>SoftUni</a:t>
@@ -3496,19 +3496,19 @@
           <a:lstStyle/>
           <a:p>
             <a:r>
-              <a:rPr lang="bg-BG" sz="1100" smtClean="0"/>
+              <a:rPr lang="bg-BG" sz="1100"/>
               <a:t>Работна група </a:t>
             </a:r>
             <a:r>
-              <a:rPr lang="bg-BG" smtClean="0"/>
+              <a:rPr lang="bg-BG"/>
               <a:t>"Образование по програмиране и ИТ"</a:t>
             </a:r>
             <a:r>
-              <a:rPr lang="bg-BG" sz="1100" smtClean="0"/>
+              <a:rPr lang="bg-BG" sz="1100"/>
               <a:t>, с подкрепата на </a:t>
             </a:r>
             <a:r>
-              <a:rPr lang="en-US" sz="1100" smtClean="0">
+              <a:rPr lang="en-US" sz="1100">
                 <a:hlinkClick r:id="rId3"/>
               </a:rPr>
               <a:t>SoftUni</a:t>
@@ -3617,19 +3617,19 @@
           <a:lstStyle/>
           <a:p>
             <a:r>
-              <a:rPr lang="bg-BG" sz="1100" smtClean="0"/>
+              <a:rPr lang="bg-BG" sz="1100"/>
               <a:t>Работна група </a:t>
             </a:r>
             <a:r>
-              <a:rPr lang="bg-BG" smtClean="0"/>
+              <a:rPr lang="bg-BG"/>
               <a:t>"Образование по програмиране и ИТ"</a:t>
             </a:r>
             <a:r>
-              <a:rPr lang="bg-BG" sz="1100" smtClean="0"/>
+              <a:rPr lang="bg-BG" sz="1100"/>
               <a:t>, с подкрепата на </a:t>
             </a:r>
             <a:r>
-              <a:rPr lang="en-US" sz="1100" smtClean="0">
+              <a:rPr lang="en-US" sz="1100">
                 <a:hlinkClick r:id="rId3"/>
               </a:rPr>
               <a:t>SoftUni</a:t>
@@ -9339,7 +9339,7 @@
           <a:p>
             <a:r>
               <a:rPr lang="bg-BG" dirty="0"/>
-              <a:t>Софтуерни и хардуерни науки</a:t>
+              <a:t>5 клас</a:t>
             </a:r>
           </a:p>
         </p:txBody>
@@ -9373,30 +9373,10 @@
           <a:lstStyle/>
           <a:p>
             <a:r>
-              <a:rPr lang="bg-BG" sz="1400" dirty="0"/>
-              <a:t>Курс </a:t>
-            </a:r>
-            <a:r>
-              <a:rPr lang="bg-BG" sz="1400" dirty="0" smtClean="0"/>
-              <a:t>„Диаграми и </a:t>
-            </a:r>
-            <a:r>
-              <a:rPr lang="ru-RU" sz="1400" dirty="0"/>
-              <a:t>х</a:t>
-            </a:r>
-            <a:r>
-              <a:rPr lang="ru-RU" sz="1400" dirty="0" smtClean="0"/>
-              <a:t>арактеристики </a:t>
-            </a:r>
-            <a:r>
-              <a:rPr lang="ru-RU" sz="1400" dirty="0"/>
-              <a:t>на оформлението на клетки и данни</a:t>
-            </a:r>
-            <a:r>
-              <a:rPr lang="bg-BG" sz="1400" dirty="0" smtClean="0"/>
-              <a:t>"</a:t>
-            </a:r>
-            <a:endParaRPr lang="en-US" sz="1400" dirty="0"/>
+              <a:rPr lang="bg-BG" dirty="0"/>
+              <a:t>Компютърно моделиране и ИТ</a:t>
+            </a:r>
+            <a:endParaRPr lang="en-US" dirty="0"/>
           </a:p>
         </p:txBody>
       </p:sp>
@@ -9475,48 +9455,6 @@
       </p:sp>
       <p:sp>
         <p:nvSpPr>
-          <p:cNvPr id="3" name="Presentation Subtitle">
-            <a:extLst>
-              <a:ext uri="{FF2B5EF4-FFF2-40B4-BE49-F238E27FC236}">
-                <a16:creationId xmlns:a16="http://schemas.microsoft.com/office/drawing/2014/main" id="{A004DC04-DA2A-41C0-8578-4B8D2F08EA7D}"/>
-              </a:ext>
-            </a:extLst>
-          </p:cNvPr>
-          <p:cNvSpPr>
-            <a:spLocks noGrp="1"/>
-          </p:cNvSpPr>
-          <p:nvPr>
-            <p:ph type="subTitle" idx="1"/>
-          </p:nvPr>
-        </p:nvSpPr>
-        <p:spPr>
-          <a:xfrm>
-            <a:off x="554746" y="1402942"/>
-            <a:ext cx="11083636" cy="1306057"/>
-          </a:xfrm>
-        </p:spPr>
-        <p:txBody>
-          <a:bodyPr>
-            <a:normAutofit lnSpcReduction="10000"/>
-          </a:bodyPr>
-          <a:lstStyle/>
-          <a:p>
-            <a:r>
-              <a:rPr lang="bg-BG" dirty="0"/>
-              <a:t>Работна група "Образование по програмиране и ИТ"</a:t>
-            </a:r>
-          </a:p>
-          <a:p>
-            <a:r>
-              <a:rPr lang="bg-BG" dirty="0"/>
-              <a:t>Свободно учебно съдържание за учители</a:t>
-            </a:r>
-            <a:endParaRPr lang="en-US" dirty="0"/>
-          </a:p>
-        </p:txBody>
-      </p:sp>
-      <p:sp>
-        <p:nvSpPr>
           <p:cNvPr id="2" name="Presentation Title">
             <a:extLst>
               <a:ext uri="{FF2B5EF4-FFF2-40B4-BE49-F238E27FC236}">
@@ -9534,16 +9472,22 @@
         <p:spPr>
           <a:xfrm>
             <a:off x="554746" y="321501"/>
-            <a:ext cx="11083636" cy="971589"/>
+            <a:ext cx="11083636" cy="1622499"/>
           </a:xfrm>
         </p:spPr>
         <p:txBody>
-          <a:bodyPr/>
+          <a:bodyPr>
+            <a:normAutofit fontScale="90000"/>
+          </a:bodyPr>
           <a:lstStyle/>
           <a:p>
             <a:r>
-              <a:rPr lang="bg-BG"/>
-              <a:t>Свободни учебни ресурси</a:t>
+              <a:rPr lang="bg-BG" sz="5400" dirty="0"/>
+              <a:t>Диаграми и </a:t>
+            </a:r>
+            <a:r>
+              <a:rPr lang="ru-RU" sz="5400" dirty="0"/>
+              <a:t>характеристики на оформлението на клетки и данни</a:t>
             </a:r>
             <a:endParaRPr lang="en-US" dirty="0"/>
           </a:p>
@@ -9579,6 +9523,68 @@
           </a:prstGeom>
         </p:spPr>
       </p:pic>
+      <p:sp>
+        <p:nvSpPr>
+          <p:cNvPr id="7" name="TextBox 6">
+            <a:extLst>
+              <a:ext uri="{FF2B5EF4-FFF2-40B4-BE49-F238E27FC236}">
+                <a16:creationId xmlns:a16="http://schemas.microsoft.com/office/drawing/2014/main" id="{8C9C765C-6E3D-C6E3-7A6F-B8602AB427CD}"/>
+              </a:ext>
+            </a:extLst>
+          </p:cNvPr>
+          <p:cNvSpPr txBox="1"/>
+          <p:nvPr/>
+        </p:nvSpPr>
+        <p:spPr>
+          <a:xfrm>
+            <a:off x="5691000" y="2564546"/>
+            <a:ext cx="4529152" cy="797050"/>
+          </a:xfrm>
+          <a:prstGeom prst="rect">
+            <a:avLst/>
+          </a:prstGeom>
+          <a:ln/>
+        </p:spPr>
+        <p:style>
+          <a:lnRef idx="2">
+            <a:schemeClr val="accent2"/>
+          </a:lnRef>
+          <a:fillRef idx="1">
+            <a:schemeClr val="lt1"/>
+          </a:fillRef>
+          <a:effectRef idx="0">
+            <a:schemeClr val="accent2"/>
+          </a:effectRef>
+          <a:fontRef idx="minor">
+            <a:schemeClr val="dk1"/>
+          </a:fontRef>
+        </p:style>
+        <p:txBody>
+          <a:bodyPr vert="horz" wrap="none" lIns="144000" tIns="108000" rIns="144000" bIns="108000" rtlCol="0">
+            <a:spAutoFit/>
+          </a:bodyPr>
+          <a:lstStyle/>
+          <a:p>
+            <a:pPr algn="l" eaLnBrk="0" hangingPunct="0">
+              <a:lnSpc>
+                <a:spcPct val="110000"/>
+              </a:lnSpc>
+              <a:buClr>
+                <a:schemeClr val="accent5">
+                  <a:lumMod val="40000"/>
+                  <a:lumOff val="60000"/>
+                </a:schemeClr>
+              </a:buClr>
+              <a:buSzPct val="70000"/>
+            </a:pPr>
+            <a:r>
+              <a:rPr lang="en-US" sz="3600" b="1" dirty="0"/>
+              <a:t>TODO: Change picture</a:t>
+            </a:r>
+            <a:endParaRPr lang="bg-BG" sz="3600" b="1" dirty="0"/>
+          </a:p>
+        </p:txBody>
+      </p:sp>
     </p:spTree>
     <p:extLst>
       <p:ext uri="{BB962C8B-B14F-4D97-AF65-F5344CB8AC3E}">
@@ -9597,13 +9603,6 @@
       <p:transition spd="slow" advClick="0" advTm="5000"/>
     </mc:Fallback>
   </mc:AlternateContent>
-  <p:timing>
-    <p:tnLst>
-      <p:par>
-        <p:cTn id="1" dur="indefinite" restart="never" nodeType="tmRoot"/>
-      </p:par>
-    </p:tnLst>
-  </p:timing>
 </p:sld>
 </file>
 
@@ -9665,19 +9664,15 @@
           <a:p>
             <a:r>
               <a:rPr lang="bg-BG" dirty="0"/>
-              <a:t>͏Форматиране на </a:t>
-            </a:r>
-            <a:r>
-              <a:rPr lang="bg-BG" dirty="0" smtClean="0"/>
-              <a:t>данни</a:t>
-            </a:r>
-            <a:r>
-              <a:rPr lang="en-US" dirty="0" smtClean="0"/>
+              <a:t>͏Форматиране на данни</a:t>
+            </a:r>
+            <a:r>
+              <a:rPr lang="en-US" dirty="0"/>
               <a:t> </a:t>
             </a:r>
             <a:r>
-              <a:rPr lang="bg-BG" dirty="0" smtClean="0"/>
-              <a:t>в клетки – Видео</a:t>
+              <a:rPr lang="bg-BG" dirty="0"/>
+              <a:t>в клетки – видео</a:t>
             </a:r>
             <a:endParaRPr lang="en-US" dirty="0"/>
           </a:p>
@@ -9731,13 +9726,6 @@
       <p:transition spd="slow" advClick="0" advTm="5000"/>
     </mc:Fallback>
   </mc:AlternateContent>
-  <p:timing>
-    <p:tnLst>
-      <p:par>
-        <p:cTn id="1" dur="indefinite" restart="never" nodeType="tmRoot"/>
-      </p:par>
-    </p:tnLst>
-  </p:timing>
 </p:sld>
 </file>
 
@@ -9774,7 +9762,7 @@
           <a:lstStyle/>
           <a:p>
             <a:r>
-              <a:rPr lang="bg-BG" dirty="0" smtClean="0"/>
+              <a:rPr lang="bg-BG" dirty="0"/>
               <a:t>Същност</a:t>
             </a:r>
             <a:endParaRPr lang="en-US" dirty="0"/>
@@ -9797,7 +9785,7 @@
           <a:lstStyle/>
           <a:p>
             <a:r>
-              <a:rPr lang="bg-BG" dirty="0" smtClean="0"/>
+              <a:rPr lang="bg-BG" dirty="0"/>
               <a:t>Диаграми</a:t>
             </a:r>
             <a:endParaRPr lang="en-US" dirty="0"/>
@@ -9891,13 +9879,6 @@
       <p:transition spd="slow" advClick="0" advTm="5000"/>
     </mc:Fallback>
   </mc:AlternateContent>
-  <p:timing>
-    <p:tnLst>
-      <p:par>
-        <p:cTn id="1" dur="indefinite" restart="never" nodeType="tmRoot"/>
-      </p:par>
-    </p:tnLst>
-  </p:timing>
 </p:sld>
 </file>
 
@@ -9934,11 +9915,11 @@
           <a:lstStyle/>
           <a:p>
             <a:r>
-              <a:rPr lang="bg-BG" b="1" dirty="0" smtClean="0"/>
+              <a:rPr lang="bg-BG" b="1" dirty="0"/>
               <a:t>͏</a:t>
             </a:r>
             <a:r>
-              <a:rPr lang="bg-BG" b="1" dirty="0" smtClean="0">
+              <a:rPr lang="bg-BG" b="1" dirty="0">
                 <a:solidFill>
                   <a:schemeClr val="bg1"/>
                 </a:solidFill>
@@ -9946,94 +9927,94 @@
               <a:t>Диаграми</a:t>
             </a:r>
             <a:r>
-              <a:rPr lang="bg-BG" dirty="0" smtClean="0"/>
+              <a:rPr lang="bg-BG" dirty="0"/>
               <a:t> – </a:t>
             </a:r>
             <a:r>
-              <a:rPr lang="bg-BG" b="1" dirty="0" smtClean="0"/>
+              <a:rPr lang="bg-BG" b="1" dirty="0"/>
               <a:t>графично онагледяване </a:t>
             </a:r>
             <a:r>
-              <a:rPr lang="bg-BG" dirty="0" smtClean="0"/>
+              <a:rPr lang="bg-BG" dirty="0"/>
               <a:t>на числовата </a:t>
             </a:r>
             <a:r>
-              <a:rPr lang="bg-BG" b="1" dirty="0" smtClean="0"/>
+              <a:rPr lang="bg-BG" b="1" dirty="0"/>
               <a:t>информация</a:t>
             </a:r>
           </a:p>
           <a:p>
             <a:pPr lvl="1"/>
             <a:r>
-              <a:rPr lang="bg-BG" dirty="0" smtClean="0"/>
+              <a:rPr lang="bg-BG" dirty="0"/>
               <a:t>Улеснява </a:t>
             </a:r>
             <a:r>
-              <a:rPr lang="bg-BG" b="1" dirty="0" smtClean="0"/>
+              <a:rPr lang="bg-BG" b="1" dirty="0"/>
               <a:t>сравняването на стойности</a:t>
             </a:r>
           </a:p>
           <a:p>
             <a:pPr lvl="1"/>
             <a:r>
-              <a:rPr lang="bg-BG" dirty="0" smtClean="0"/>
-              <a:t>Помага </a:t>
-            </a:r>
-            <a:r>
-              <a:rPr lang="bg-BG" b="1" dirty="0" smtClean="0"/>
+              <a:rPr lang="bg-BG" dirty="0"/>
+              <a:t>Помага при </a:t>
+            </a:r>
+            <a:r>
+              <a:rPr lang="bg-BG" b="1" dirty="0"/>
               <a:t>анализирането на данни</a:t>
             </a:r>
           </a:p>
           <a:p>
             <a:r>
-              <a:rPr lang="bg-BG" b="1" dirty="0" smtClean="0"/>
+              <a:rPr lang="bg-BG" b="1" dirty="0"/>
               <a:t>Данните</a:t>
             </a:r>
             <a:r>
-              <a:rPr lang="bg-BG" dirty="0" smtClean="0"/>
+              <a:rPr lang="bg-BG" dirty="0"/>
               <a:t> и </a:t>
             </a:r>
             <a:r>
-              <a:rPr lang="bg-BG" b="1" dirty="0" smtClean="0"/>
+              <a:rPr lang="bg-BG" b="1" dirty="0"/>
               <a:t>графичната</a:t>
             </a:r>
             <a:r>
-              <a:rPr lang="bg-BG" dirty="0" smtClean="0"/>
+              <a:rPr lang="bg-BG" dirty="0"/>
               <a:t> им интерпретация са </a:t>
             </a:r>
             <a:r>
-              <a:rPr lang="bg-BG" b="1" dirty="0" smtClean="0"/>
+              <a:rPr lang="bg-BG" b="1" dirty="0"/>
               <a:t>логически свързани</a:t>
             </a:r>
           </a:p>
           <a:p>
             <a:pPr lvl="1"/>
             <a:r>
-              <a:rPr lang="bg-BG" b="1" dirty="0" smtClean="0"/>
+              <a:rPr lang="bg-BG" b="1" dirty="0"/>
               <a:t>Изменението</a:t>
             </a:r>
             <a:r>
-              <a:rPr lang="bg-BG" dirty="0" smtClean="0"/>
+              <a:rPr lang="bg-BG" dirty="0"/>
               <a:t> на </a:t>
             </a:r>
             <a:r>
-              <a:rPr lang="bg-BG" b="1" dirty="0" smtClean="0"/>
+              <a:rPr lang="bg-BG" b="1" dirty="0"/>
               <a:t>данните</a:t>
             </a:r>
             <a:r>
-              <a:rPr lang="bg-BG" dirty="0" smtClean="0"/>
+              <a:rPr lang="bg-BG" dirty="0"/>
               <a:t> води до </a:t>
             </a:r>
             <a:r>
-              <a:rPr lang="bg-BG" b="1" dirty="0" smtClean="0"/>
+              <a:rPr lang="bg-BG" b="1" dirty="0"/>
               <a:t>автоматично изменение </a:t>
             </a:r>
             <a:r>
-              <a:rPr lang="bg-BG" dirty="0" smtClean="0"/>
+              <a:rPr lang="bg-BG" dirty="0"/>
               <a:t>на </a:t>
             </a:r>
             <a:r>
-              <a:rPr lang="bg-BG" b="1" dirty="0" smtClean="0"/>
+              <a:rPr lang="bg-BG" b="1" dirty="0"/>
               <a:t>диграмата</a:t>
             </a:r>
             <a:endParaRPr lang="en-US" b="1" dirty="0"/>
@@ -10056,7 +10037,7 @@
           <a:lstStyle/>
           <a:p>
             <a:r>
-              <a:rPr lang="bg-BG" dirty="0" smtClean="0"/>
+              <a:rPr lang="bg-BG" dirty="0"/>
               <a:t>Диаграми</a:t>
             </a:r>
             <a:endParaRPr lang="en-US" dirty="0"/>
@@ -10117,7 +10098,7 @@
                                         <p:tgtEl>
                                           <p:spTgt spid="5">
                                             <p:txEl>
-                                              <p:pRg st="2" end="2"/>
+                                              <p:pRg st="1" end="1"/>
                                             </p:txEl>
                                           </p:spTgt>
                                         </p:tgtEl>
@@ -10166,6 +10147,55 @@
                                         <p:tgtEl>
                                           <p:spTgt spid="5">
                                             <p:txEl>
+                                              <p:pRg st="2" end="2"/>
+                                            </p:txEl>
+                                          </p:spTgt>
+                                        </p:tgtEl>
+                                        <p:attrNameLst>
+                                          <p:attrName>style.visibility</p:attrName>
+                                        </p:attrNameLst>
+                                      </p:cBhvr>
+                                      <p:to>
+                                        <p:strVal val="visible"/>
+                                      </p:to>
+                                    </p:set>
+                                  </p:childTnLst>
+                                </p:cTn>
+                              </p:par>
+                            </p:childTnLst>
+                          </p:cTn>
+                        </p:par>
+                      </p:childTnLst>
+                    </p:cTn>
+                  </p:par>
+                  <p:par>
+                    <p:cTn id="11" fill="hold">
+                      <p:stCondLst>
+                        <p:cond delay="indefinite"/>
+                      </p:stCondLst>
+                      <p:childTnLst>
+                        <p:par>
+                          <p:cTn id="12" fill="hold">
+                            <p:stCondLst>
+                              <p:cond delay="0"/>
+                            </p:stCondLst>
+                            <p:childTnLst>
+                              <p:par>
+                                <p:cTn id="13" presetID="1" presetClass="entr" presetSubtype="0" fill="hold" nodeType="clickEffect">
+                                  <p:stCondLst>
+                                    <p:cond delay="0"/>
+                                  </p:stCondLst>
+                                  <p:childTnLst>
+                                    <p:set>
+                                      <p:cBhvr>
+                                        <p:cTn id="14" dur="1" fill="hold">
+                                          <p:stCondLst>
+                                            <p:cond delay="0"/>
+                                          </p:stCondLst>
+                                        </p:cTn>
+                                        <p:tgtEl>
+                                          <p:spTgt spid="5">
+                                            <p:txEl>
                                               <p:pRg st="3" end="3"/>
                                             </p:txEl>
                                           </p:spTgt>
@@ -10181,15 +10211,33 @@
                                   </p:childTnLst>
                                 </p:cTn>
                               </p:par>
+                            </p:childTnLst>
+                          </p:cTn>
+                        </p:par>
+                      </p:childTnLst>
+                    </p:cTn>
+                  </p:par>
+                  <p:par>
+                    <p:cTn id="15" fill="hold">
+                      <p:stCondLst>
+                        <p:cond delay="indefinite"/>
+                      </p:stCondLst>
+                      <p:childTnLst>
+                        <p:par>
+                          <p:cTn id="16" fill="hold">
+                            <p:stCondLst>
+                              <p:cond delay="0"/>
+                            </p:stCondLst>
+                            <p:childTnLst>
                               <p:par>
-                                <p:cTn id="11" presetID="1" presetClass="entr" presetSubtype="0" fill="hold" nodeType="withEffect">
+                                <p:cTn id="17" presetID="1" presetClass="entr" presetSubtype="0" fill="hold" nodeType="clickEffect">
                                   <p:stCondLst>
                                     <p:cond delay="0"/>
                                   </p:stCondLst>
                                   <p:childTnLst>
                                     <p:set>
                                       <p:cBhvr>
-                                        <p:cTn id="12" dur="1" fill="hold">
+                                        <p:cTn id="18" dur="1" fill="hold">
                                           <p:stCondLst>
                                             <p:cond delay="0"/>
                                           </p:stCondLst>
@@ -10402,7 +10450,7 @@
           <a:lstStyle/>
           <a:p>
             <a:r>
-              <a:rPr lang="bg-BG" dirty="0" smtClean="0"/>
+              <a:rPr lang="bg-BG" dirty="0"/>
               <a:t>Основни части в диаграмите</a:t>
             </a:r>
             <a:endParaRPr lang="en-US" dirty="0"/>
@@ -10535,7 +10583,7 @@
           <a:p>
             <a:pPr algn="ctr"/>
             <a:r>
-              <a:rPr lang="bg-BG" sz="2800" b="1" dirty="0" smtClean="0">
+              <a:rPr lang="bg-BG" sz="2800" b="1" dirty="0">
                 <a:solidFill>
                   <a:srgbClr val="FFFFFF"/>
                 </a:solidFill>
@@ -10690,7 +10738,7 @@
           <a:p>
             <a:pPr algn="ctr"/>
             <a:r>
-              <a:rPr lang="bg-BG" sz="2800" b="1" dirty="0" smtClean="0">
+              <a:rPr lang="bg-BG" sz="2800" b="1" dirty="0">
                 <a:solidFill>
                   <a:srgbClr val="FFFFFF"/>
                 </a:solidFill>
@@ -10845,7 +10893,7 @@
           <a:p>
             <a:pPr algn="ctr"/>
             <a:r>
-              <a:rPr lang="bg-BG" sz="2800" b="1" dirty="0" smtClean="0">
+              <a:rPr lang="bg-BG" sz="2800" b="1" dirty="0">
                 <a:solidFill>
                   <a:srgbClr val="FFFFFF"/>
                 </a:solidFill>
@@ -10934,7 +10982,7 @@
           <a:p>
             <a:pPr algn="ctr"/>
             <a:r>
-              <a:rPr lang="bg-BG" sz="2800" b="1" dirty="0" smtClean="0">
+              <a:rPr lang="bg-BG" sz="2800" b="1" dirty="0">
                 <a:solidFill>
                   <a:srgbClr val="FFFFFF"/>
                 </a:solidFill>
@@ -10949,7 +10997,7 @@
               <a:t>Надписи на</a:t>
             </a:r>
             <a:r>
-              <a:rPr lang="en-US" sz="2800" b="1" dirty="0" smtClean="0">
+              <a:rPr lang="en-US" sz="2800" b="1" dirty="0">
                 <a:solidFill>
                   <a:srgbClr val="FFFFFF"/>
                 </a:solidFill>
@@ -10964,7 +11012,7 @@
               <a:t> </a:t>
             </a:r>
             <a:r>
-              <a:rPr lang="bg-BG" sz="2800" b="1" dirty="0" smtClean="0">
+              <a:rPr lang="bg-BG" sz="2800" b="1" dirty="0">
                 <a:solidFill>
                   <a:srgbClr val="FFFFFF"/>
                 </a:solidFill>
@@ -10976,7 +11024,7 @@
                   </a:outerShdw>
                 </a:effectLst>
               </a:rPr>
-              <a:t>въведените данните</a:t>
+              <a:t>въведените данни</a:t>
             </a:r>
             <a:endParaRPr lang="en-US" sz="2800" b="1" dirty="0">
               <a:solidFill>
@@ -11565,7 +11613,7 @@
           <a:lstStyle/>
           <a:p>
             <a:r>
-              <a:rPr lang="bg-BG" dirty="0" smtClean="0"/>
+              <a:rPr lang="bg-BG" dirty="0"/>
               <a:t>Създаване на диаграми</a:t>
             </a:r>
             <a:endParaRPr lang="en-US" dirty="0"/>
@@ -11593,8 +11641,8 @@
         </p:blipFill>
         <p:spPr>
           <a:xfrm>
-            <a:off x="0" y="1101150"/>
-            <a:ext cx="12192000" cy="5792850"/>
+            <a:off x="0" y="1089000"/>
+            <a:ext cx="12192000" cy="5805000"/>
           </a:xfrm>
           <a:prstGeom prst="rect">
             <a:avLst/>
@@ -11609,8 +11657,8 @@
         </p:nvSpPr>
         <p:spPr bwMode="auto">
           <a:xfrm>
-            <a:off x="4116000" y="2799000"/>
-            <a:ext cx="6570000" cy="1935000"/>
+            <a:off x="4116000" y="3024000"/>
+            <a:ext cx="6570000" cy="1710000"/>
           </a:xfrm>
           <a:prstGeom prst="wedgeRoundRectCallout">
             <a:avLst>
@@ -11661,7 +11709,7 @@
           <a:p>
             <a:pPr algn="ctr"/>
             <a:r>
-              <a:rPr lang="bg-BG" sz="2800" b="1" dirty="0" smtClean="0">
+              <a:rPr lang="bg-BG" sz="2800" b="1" dirty="0">
                 <a:solidFill>
                   <a:srgbClr val="FFFFFF"/>
                 </a:solidFill>
@@ -11676,7 +11724,7 @@
               <a:t>За да създадете диаграма, трябва да сте </a:t>
             </a:r>
             <a:r>
-              <a:rPr lang="bg-BG" sz="2800" b="1" dirty="0" smtClean="0">
+              <a:rPr lang="bg-BG" sz="2800" b="1" dirty="0">
                 <a:solidFill>
                   <a:schemeClr val="bg1">
                     <a:lumMod val="60000"/>
@@ -11694,7 +11742,7 @@
               <a:t>маркирали данните</a:t>
             </a:r>
             <a:r>
-              <a:rPr lang="bg-BG" sz="2800" b="1" dirty="0" smtClean="0">
+              <a:rPr lang="bg-BG" sz="2800" b="1" dirty="0">
                 <a:solidFill>
                   <a:srgbClr val="FFFFFF"/>
                 </a:solidFill>
@@ -11975,7 +12023,7 @@
           <a:p>
             <a:pPr algn="ctr"/>
             <a:r>
-              <a:rPr lang="bg-BG" sz="2800" b="1" dirty="0" smtClean="0">
+              <a:rPr lang="bg-BG" sz="2800" b="1" dirty="0">
                 <a:solidFill>
                   <a:srgbClr val="FFFFFF"/>
                 </a:solidFill>
@@ -11990,7 +12038,7 @@
               <a:t>След което си избирате </a:t>
             </a:r>
             <a:r>
-              <a:rPr lang="bg-BG" sz="2800" b="1" dirty="0" smtClean="0">
+              <a:rPr lang="bg-BG" sz="2800" b="1" dirty="0">
                 <a:solidFill>
                   <a:schemeClr val="bg1">
                     <a:lumMod val="60000"/>
@@ -12008,7 +12056,7 @@
               <a:t>вид</a:t>
             </a:r>
             <a:r>
-              <a:rPr lang="en-US" sz="2800" b="1" dirty="0" smtClean="0">
+              <a:rPr lang="en-US" sz="2800" b="1" dirty="0">
                 <a:solidFill>
                   <a:schemeClr val="bg1">
                     <a:lumMod val="60000"/>
@@ -12026,7 +12074,7 @@
               <a:t>a</a:t>
             </a:r>
             <a:r>
-              <a:rPr lang="bg-BG" sz="2800" b="1" dirty="0" smtClean="0">
+              <a:rPr lang="bg-BG" sz="2800" b="1" dirty="0">
                 <a:solidFill>
                   <a:schemeClr val="bg1">
                     <a:lumMod val="60000"/>
@@ -12044,7 +12092,7 @@
               <a:t> на диаграмата</a:t>
             </a:r>
             <a:r>
-              <a:rPr lang="bg-BG" sz="2800" b="1" dirty="0" smtClean="0">
+              <a:rPr lang="bg-BG" sz="2800" b="1" dirty="0">
                 <a:solidFill>
                   <a:srgbClr val="FFFFFF"/>
                 </a:solidFill>
@@ -12437,7 +12485,7 @@
           <a:p>
             <a:pPr algn="ctr"/>
             <a:r>
-              <a:rPr lang="bg-BG" sz="2800" b="1" dirty="0" smtClean="0">
+              <a:rPr lang="bg-BG" sz="2800" b="1" dirty="0">
                 <a:solidFill>
                   <a:srgbClr val="FFFFFF"/>
                 </a:solidFill>
@@ -12452,7 +12500,7 @@
               <a:t>Накрая </a:t>
             </a:r>
             <a:r>
-              <a:rPr lang="en-US" sz="2800" b="1" dirty="0" smtClean="0">
+              <a:rPr lang="en-US" sz="2800" b="1" dirty="0">
                 <a:solidFill>
                   <a:srgbClr val="FFFFFF"/>
                 </a:solidFill>
@@ -12467,7 +12515,7 @@
               <a:t>Excel </a:t>
             </a:r>
             <a:r>
-              <a:rPr lang="bg-BG" sz="2800" b="1" dirty="0" smtClean="0">
+              <a:rPr lang="bg-BG" sz="2800" b="1" dirty="0">
                 <a:solidFill>
                   <a:srgbClr val="FFFFFF"/>
                 </a:solidFill>
@@ -12514,13 +12562,6 @@
       <p:transition spd="slow" advClick="0" advTm="5000"/>
     </mc:Fallback>
   </mc:AlternateContent>
-  <p:timing>
-    <p:tnLst>
-      <p:par>
-        <p:cTn id="1" dur="indefinite" restart="never" nodeType="tmRoot"/>
-      </p:par>
-    </p:tnLst>
-  </p:timing>
 </p:sld>
 </file>
 
@@ -12562,7 +12603,7 @@
           <a:lstStyle/>
           <a:p>
             <a:r>
-              <a:rPr lang="bg-BG" dirty="0" smtClean="0"/>
+              <a:rPr lang="bg-BG" dirty="0"/>
               <a:t>Видове диаграми</a:t>
             </a:r>
             <a:endParaRPr lang="en-US" dirty="0"/>
@@ -12649,13 +12690,6 @@
       <p:transition spd="slow" advClick="0" advTm="5000"/>
     </mc:Fallback>
   </mc:AlternateContent>
-  <p:timing>
-    <p:tnLst>
-      <p:par>
-        <p:cTn id="1" dur="indefinite" restart="never" nodeType="tmRoot"/>
-      </p:par>
-    </p:tnLst>
-  </p:timing>
 </p:sld>
 </file>
 
@@ -12692,11 +12726,11 @@
           <a:lstStyle/>
           <a:p>
             <a:r>
-              <a:rPr lang="bg-BG" dirty="0" smtClean="0"/>
+              <a:rPr lang="bg-BG" dirty="0"/>
               <a:t>͏</a:t>
             </a:r>
             <a:r>
-              <a:rPr lang="bg-BG" b="1" dirty="0" smtClean="0">
+              <a:rPr lang="bg-BG" b="1" dirty="0">
                 <a:solidFill>
                   <a:schemeClr val="bg1"/>
                 </a:solidFill>
@@ -12704,23 +12738,23 @@
               <a:t>Колонна диаграма </a:t>
             </a:r>
             <a:r>
-              <a:rPr lang="bg-BG" dirty="0" smtClean="0"/>
+              <a:rPr lang="bg-BG" dirty="0"/>
               <a:t>– илюстрира </a:t>
             </a:r>
             <a:r>
-              <a:rPr lang="bg-BG" b="1" dirty="0" smtClean="0"/>
+              <a:rPr lang="bg-BG" b="1" dirty="0"/>
               <a:t>изменение</a:t>
             </a:r>
             <a:r>
-              <a:rPr lang="bg-BG" dirty="0" smtClean="0"/>
+              <a:rPr lang="bg-BG" dirty="0"/>
               <a:t> на </a:t>
             </a:r>
             <a:r>
-              <a:rPr lang="bg-BG" b="1" dirty="0" smtClean="0"/>
+              <a:rPr lang="bg-BG" b="1" dirty="0"/>
               <a:t>една или повече серии </a:t>
             </a:r>
             <a:r>
-              <a:rPr lang="bg-BG" dirty="0" smtClean="0"/>
+              <a:rPr lang="bg-BG" dirty="0"/>
               <a:t>от данни</a:t>
             </a:r>
             <a:endParaRPr lang="en-US" dirty="0"/>
@@ -12743,10 +12777,13 @@
           <a:lstStyle/>
           <a:p>
             <a:r>
-              <a:rPr lang="bg-BG" dirty="0" smtClean="0"/>
-              <a:t>Колонна диаграма</a:t>
-            </a:r>
-            <a:endParaRPr lang="en-US" dirty="0"/>
+              <a:rPr lang="bg-BG" dirty="0"/>
+              <a:t>Колонна диаграма (</a:t>
+            </a:r>
+            <a:r>
+              <a:rPr lang="en-US" dirty="0"/>
+              <a:t>Column chart)</a:t>
+            </a:r>
           </a:p>
         </p:txBody>
       </p:sp>
@@ -12937,11 +12974,11 @@
           <a:lstStyle/>
           <a:p>
             <a:r>
-              <a:rPr lang="bg-BG" dirty="0" smtClean="0"/>
+              <a:rPr lang="bg-BG" dirty="0"/>
               <a:t>͏</a:t>
             </a:r>
             <a:r>
-              <a:rPr lang="bg-BG" b="1" dirty="0" smtClean="0">
+              <a:rPr lang="bg-BG" b="1" dirty="0">
                 <a:solidFill>
                   <a:schemeClr val="bg1"/>
                 </a:solidFill>
@@ -12949,11 +12986,11 @@
               <a:t>Линейна диаграма </a:t>
             </a:r>
             <a:r>
-              <a:rPr lang="bg-BG" dirty="0" smtClean="0"/>
+              <a:rPr lang="bg-BG" dirty="0"/>
               <a:t>– илюстрира </a:t>
             </a:r>
             <a:r>
-              <a:rPr lang="bg-BG" b="1" dirty="0" smtClean="0"/>
+              <a:rPr lang="bg-BG" b="1" dirty="0"/>
               <a:t>изменение на стойности във времето</a:t>
             </a:r>
             <a:endParaRPr lang="en-US" b="1" dirty="0"/>
@@ -12976,10 +13013,13 @@
           <a:lstStyle/>
           <a:p>
             <a:r>
-              <a:rPr lang="bg-BG" dirty="0" smtClean="0"/>
+              <a:rPr lang="bg-BG" dirty="0"/>
               <a:t>Линейна диаграма</a:t>
             </a:r>
-            <a:endParaRPr lang="en-US" dirty="0"/>
+            <a:r>
+              <a:rPr lang="en-US" dirty="0"/>
+              <a:t> (Line chart)</a:t>
+            </a:r>
           </a:p>
         </p:txBody>
       </p:sp>
@@ -13065,7 +13105,7 @@
                 <a:buSzPct val="70000"/>
               </a:pPr>
               <a:r>
-                <a:rPr lang="bg-BG" sz="2000" dirty="0" smtClean="0">
+                <a:rPr lang="bg-BG" sz="2000" dirty="0">
                   <a:solidFill>
                     <a:schemeClr val="bg1"/>
                   </a:solidFill>
@@ -13073,11 +13113,11 @@
                 <a:t>Население</a:t>
               </a:r>
               <a:r>
-                <a:rPr lang="bg-BG" sz="2000" dirty="0" smtClean="0"/>
+                <a:rPr lang="bg-BG" sz="2000" dirty="0"/>
                 <a:t> </a:t>
               </a:r>
               <a:r>
-                <a:rPr lang="bg-BG" sz="2000" dirty="0" smtClean="0">
+                <a:rPr lang="bg-BG" sz="2000" dirty="0">
                   <a:solidFill>
                     <a:schemeClr val="bg1"/>
                   </a:solidFill>
@@ -13357,29 +13397,82 @@
           <a:lstStyle/>
           <a:p>
             <a:r>
-              <a:rPr lang="bg-BG" dirty="0" smtClean="0"/>
-              <a:t>͏</a:t>
-            </a:r>
-            <a:r>
               <a:rPr lang="bg-BG" dirty="0"/>
-              <a:t>͏Форматиране в </a:t>
+              <a:t>͏͏Форматиране в </a:t>
             </a:r>
             <a:r>
               <a:rPr lang="en-US" dirty="0"/>
               <a:t>Excel</a:t>
             </a:r>
-            <a:endParaRPr lang="bg-BG" dirty="0" smtClean="0"/>
-          </a:p>
-          <a:p>
-            <a:r>
-              <a:rPr lang="bg-BG" dirty="0" smtClean="0"/>
+            <a:endParaRPr lang="bg-BG" dirty="0"/>
+          </a:p>
+          <a:p>
+            <a:r>
+              <a:rPr lang="bg-BG" dirty="0"/>
               <a:t>Диаграми</a:t>
             </a:r>
           </a:p>
           <a:p>
             <a:r>
-              <a:rPr lang="bg-BG" dirty="0" smtClean="0"/>
+              <a:rPr lang="bg-BG" dirty="0"/>
               <a:t>Видове диаграми</a:t>
+            </a:r>
+          </a:p>
+          <a:p>
+            <a:pPr lvl="1"/>
+            <a:r>
+              <a:rPr lang="bg-BG" dirty="0"/>
+              <a:t>͏</a:t>
+            </a:r>
+            <a:r>
+              <a:rPr lang="bg-BG" b="1" dirty="0">
+                <a:solidFill>
+                  <a:schemeClr val="bg1"/>
+                </a:solidFill>
+              </a:rPr>
+              <a:t>Колонна </a:t>
+            </a:r>
+            <a:r>
+              <a:rPr lang="bg-BG" dirty="0"/>
+              <a:t>диаграма</a:t>
+            </a:r>
+          </a:p>
+          <a:p>
+            <a:pPr lvl="1"/>
+            <a:r>
+              <a:rPr lang="bg-BG" dirty="0"/>
+              <a:t>͏</a:t>
+            </a:r>
+            <a:r>
+              <a:rPr lang="bg-BG" b="1" dirty="0">
+                <a:solidFill>
+                  <a:schemeClr val="bg1"/>
+                </a:solidFill>
+              </a:rPr>
+              <a:t>Линейна </a:t>
+            </a:r>
+            <a:r>
+              <a:rPr lang="bg-BG" dirty="0"/>
+              <a:t>диаграма</a:t>
+            </a:r>
+          </a:p>
+          <a:p>
+            <a:pPr lvl="1"/>
+            <a:r>
+              <a:rPr lang="bg-BG" dirty="0"/>
+              <a:t>͏</a:t>
+            </a:r>
+            <a:r>
+              <a:rPr lang="bg-BG" b="1" dirty="0">
+                <a:solidFill>
+                  <a:schemeClr val="bg1"/>
+                </a:solidFill>
+              </a:rPr>
+              <a:t>Кръгова </a:t>
+            </a:r>
+            <a:r>
+              <a:rPr lang="bg-BG" dirty="0"/>
+              <a:t>диаграма</a:t>
             </a:r>
           </a:p>
           <a:p>
@@ -13588,6 +13681,153 @@
                       </p:childTnLst>
                     </p:cTn>
                   </p:par>
+                  <p:par>
+                    <p:cTn id="11" fill="hold">
+                      <p:stCondLst>
+                        <p:cond delay="indefinite"/>
+                      </p:stCondLst>
+                      <p:childTnLst>
+                        <p:par>
+                          <p:cTn id="12" fill="hold">
+                            <p:stCondLst>
+                              <p:cond delay="0"/>
+                            </p:stCondLst>
+                            <p:childTnLst>
+                              <p:par>
+                                <p:cTn id="13" presetID="1" presetClass="entr" presetSubtype="0" fill="hold" nodeType="clickEffect">
+                                  <p:stCondLst>
+                                    <p:cond delay="0"/>
+                                  </p:stCondLst>
+                                  <p:childTnLst>
+                                    <p:set>
+                                      <p:cBhvr>
+                                        <p:cTn id="14" dur="1" fill="hold">
+                                          <p:stCondLst>
+                                            <p:cond delay="0"/>
+                                          </p:stCondLst>
+                                        </p:cTn>
+                                        <p:tgtEl>
+                                          <p:spTgt spid="444419">
+                                            <p:txEl>
+                                              <p:pRg st="3" end="3"/>
+                                            </p:txEl>
+                                          </p:spTgt>
+                                        </p:tgtEl>
+                                        <p:attrNameLst>
+                                          <p:attrName>style.visibility</p:attrName>
+                                        </p:attrNameLst>
+                                      </p:cBhvr>
+                                      <p:to>
+                                        <p:strVal val="visible"/>
+                                      </p:to>
+                                    </p:set>
+                                  </p:childTnLst>
+                                </p:cTn>
+                              </p:par>
+                            </p:childTnLst>
+                          </p:cTn>
+                        </p:par>
+                      </p:childTnLst>
+                    </p:cTn>
+                  </p:par>
+                  <p:par>
+                    <p:cTn id="15" fill="hold">
+                      <p:stCondLst>
+                        <p:cond delay="indefinite"/>
+                      </p:stCondLst>
+                      <p:childTnLst>
+                        <p:par>
+                          <p:cTn id="16" fill="hold">
+                            <p:stCondLst>
+                              <p:cond delay="0"/>
+                            </p:stCondLst>
+                            <p:childTnLst>
+                              <p:par>
+                                <p:cTn id="17" presetID="1" presetClass="entr" presetSubtype="0" fill="hold" nodeType="clickEffect">
+                                  <p:stCondLst>
+                                    <p:cond delay="0"/>
+                                  </p:stCondLst>
+                                  <p:childTnLst>
+                                    <p:set>
+                                      <p:cBhvr>
+                                        <p:cTn id="18" dur="1" fill="hold">
+                                          <p:stCondLst>
+                                            <p:cond delay="0"/>
+                                          </p:stCondLst>
+                                        </p:cTn>
+                                        <p:tgtEl>
+                                          <p:spTgt spid="444419">
+                                            <p:txEl>
+                                              <p:pRg st="4" end="4"/>
+                                            </p:txEl>
+                                          </p:spTgt>
+                                        </p:tgtEl>
+                                        <p:attrNameLst>
+                                          <p:attrName>style.visibility</p:attrName>
+                                        </p:attrNameLst>
+                                      </p:cBhvr>
+                                      <p:to>
+                                        <p:strVal val="visible"/>
+                                      </p:to>
+                                    </p:set>
+                                  </p:childTnLst>
+                                </p:cTn>
+                              </p:par>
+                            </p:childTnLst>
+                          </p:cTn>
+                        </p:par>
+                      </p:childTnLst>
+                    </p:cTn>
+                  </p:par>
+                  <p:par>
+                    <p:cTn id="19" fill="hold">
+                      <p:stCondLst>
+                        <p:cond delay="indefinite"/>
+                      </p:stCondLst>
+                      <p:childTnLst>
+                        <p:par>
+                          <p:cTn id="20" fill="hold">
+                            <p:stCondLst>
+                              <p:cond delay="0"/>
+                            </p:stCondLst>
+                            <p:childTnLst>
+                              <p:par>
+                                <p:cTn id="21" presetID="1" presetClass="entr" presetSubtype="0" fill="hold" nodeType="clickEffect">
+                                  <p:stCondLst>
+                                    <p:cond delay="0"/>
+                                  </p:stCondLst>
+                                  <p:childTnLst>
+                                    <p:set>
+                                      <p:cBhvr>
+                                        <p:cTn id="22" dur="1" fill="hold">
+                                          <p:stCondLst>
+                                            <p:cond delay="0"/>
+                                          </p:stCondLst>
+                                        </p:cTn>
+                                        <p:tgtEl>
+                                          <p:spTgt spid="444419">
+                                            <p:txEl>
+                                              <p:pRg st="5" end="5"/>
+                                            </p:txEl>
+                                          </p:spTgt>
+                                        </p:tgtEl>
+                                        <p:attrNameLst>
+                                          <p:attrName>style.visibility</p:attrName>
+                                        </p:attrNameLst>
+                                      </p:cBhvr>
+                                      <p:to>
+                                        <p:strVal val="visible"/>
+                                      </p:to>
+                                    </p:set>
+                                  </p:childTnLst>
+                                </p:cTn>
+                              </p:par>
+                            </p:childTnLst>
+                          </p:cTn>
+                        </p:par>
+                      </p:childTnLst>
+                    </p:cTn>
+                  </p:par>
                 </p:childTnLst>
               </p:cTn>
               <p:prevCondLst>
@@ -13670,11 +13910,11 @@
           <a:lstStyle/>
           <a:p>
             <a:r>
-              <a:rPr lang="bg-BG" dirty="0" smtClean="0"/>
+              <a:rPr lang="bg-BG" dirty="0"/>
               <a:t>͏</a:t>
             </a:r>
             <a:r>
-              <a:rPr lang="bg-BG" b="1" dirty="0" smtClean="0">
+              <a:rPr lang="bg-BG" b="1" dirty="0">
                 <a:solidFill>
                   <a:schemeClr val="bg1"/>
                 </a:solidFill>
@@ -13682,30 +13922,30 @@
               <a:t>Кръгова диаграма </a:t>
             </a:r>
             <a:r>
-              <a:rPr lang="bg-BG" dirty="0" smtClean="0"/>
+              <a:rPr lang="bg-BG" dirty="0"/>
               <a:t>– представя как се </a:t>
             </a:r>
             <a:r>
-              <a:rPr lang="bg-BG" b="1" dirty="0" smtClean="0"/>
+              <a:rPr lang="bg-BG" b="1" dirty="0"/>
               <a:t>отнася една стойност спрямо друга</a:t>
             </a:r>
           </a:p>
           <a:p>
             <a:pPr lvl="1"/>
             <a:r>
-              <a:rPr lang="bg-BG" dirty="0" smtClean="0"/>
+              <a:rPr lang="bg-BG" dirty="0"/>
               <a:t>Илюстрира </a:t>
             </a:r>
             <a:r>
-              <a:rPr lang="bg-BG" b="1" dirty="0" smtClean="0"/>
+              <a:rPr lang="bg-BG" b="1" dirty="0"/>
               <a:t>относителен дял </a:t>
             </a:r>
             <a:r>
-              <a:rPr lang="bg-BG" dirty="0" smtClean="0"/>
+              <a:rPr lang="bg-BG" dirty="0"/>
               <a:t>спрямо </a:t>
             </a:r>
             <a:r>
-              <a:rPr lang="bg-BG" b="1" dirty="0" smtClean="0"/>
+              <a:rPr lang="bg-BG" b="1" dirty="0"/>
               <a:t>цялата сума</a:t>
             </a:r>
             <a:endParaRPr lang="en-US" b="1" dirty="0"/>
@@ -13728,10 +13968,13 @@
           <a:lstStyle/>
           <a:p>
             <a:r>
-              <a:rPr lang="bg-BG" dirty="0" smtClean="0"/>
+              <a:rPr lang="bg-BG" dirty="0"/>
               <a:t>Кръгова диаграма</a:t>
             </a:r>
-            <a:endParaRPr lang="en-US" dirty="0"/>
+            <a:r>
+              <a:rPr lang="en-US" dirty="0"/>
+              <a:t> (Pie chart)</a:t>
+            </a:r>
           </a:p>
         </p:txBody>
       </p:sp>
@@ -13899,6 +14142,55 @@
                                     <p:set>
                                       <p:cBhvr>
                                         <p:cTn id="6" dur="1" fill="hold">
+                                          <p:stCondLst>
+                                            <p:cond delay="0"/>
+                                          </p:stCondLst>
+                                        </p:cTn>
+                                        <p:tgtEl>
+                                          <p:spTgt spid="3">
+                                            <p:txEl>
+                                              <p:pRg st="1" end="1"/>
+                                            </p:txEl>
+                                          </p:spTgt>
+                                        </p:tgtEl>
+                                        <p:attrNameLst>
+                                          <p:attrName>style.visibility</p:attrName>
+                                        </p:attrNameLst>
+                                      </p:cBhvr>
+                                      <p:to>
+                                        <p:strVal val="visible"/>
+                                      </p:to>
+                                    </p:set>
+                                  </p:childTnLst>
+                                </p:cTn>
+                              </p:par>
+                            </p:childTnLst>
+                          </p:cTn>
+                        </p:par>
+                      </p:childTnLst>
+                    </p:cTn>
+                  </p:par>
+                  <p:par>
+                    <p:cTn id="7" fill="hold">
+                      <p:stCondLst>
+                        <p:cond delay="indefinite"/>
+                      </p:stCondLst>
+                      <p:childTnLst>
+                        <p:par>
+                          <p:cTn id="8" fill="hold">
+                            <p:stCondLst>
+                              <p:cond delay="0"/>
+                            </p:stCondLst>
+                            <p:childTnLst>
+                              <p:par>
+                                <p:cTn id="9" presetID="1" presetClass="entr" presetSubtype="0" fill="hold" nodeType="clickEffect">
+                                  <p:stCondLst>
+                                    <p:cond delay="0"/>
+                                  </p:stCondLst>
+                                  <p:childTnLst>
+                                    <p:set>
+                                      <p:cBhvr>
+                                        <p:cTn id="10" dur="1" fill="hold">
                                           <p:stCondLst>
                                             <p:cond delay="0"/>
                                           </p:stCondLst>
@@ -14619,12 +14911,23 @@
               </a:buClr>
             </a:pPr>
             <a:r>
-              <a:rPr lang="bg-BG" sz="2800" dirty="0" smtClean="0">
+              <a:rPr lang="bg-BG" sz="2800" b="1" dirty="0">
+                <a:solidFill>
+                  <a:schemeClr val="bg1">
+                    <a:lumMod val="60000"/>
+                    <a:lumOff val="40000"/>
+                  </a:schemeClr>
+                </a:solidFill>
+              </a:rPr>
+              <a:t>Форматиране</a:t>
+            </a:r>
+            <a:r>
+              <a:rPr lang="bg-BG" sz="2800" dirty="0">
                 <a:solidFill>
                   <a:schemeClr val="bg2"/>
                 </a:solidFill>
               </a:rPr>
-              <a:t>Форматиране на клетки:</a:t>
+              <a:t> на клетки:</a:t>
             </a:r>
           </a:p>
           <a:p>
@@ -14637,7 +14940,7 @@
               </a:buClr>
             </a:pPr>
             <a:r>
-              <a:rPr lang="bg-BG" sz="2600" b="1" dirty="0" smtClean="0">
+              <a:rPr lang="bg-BG" sz="2600" b="1" dirty="0">
                 <a:solidFill>
                   <a:schemeClr val="bg2"/>
                 </a:solidFill>
@@ -14645,7 +14948,7 @@
               <a:t>Шрифт</a:t>
             </a:r>
             <a:r>
-              <a:rPr lang="bg-BG" sz="2600" dirty="0" smtClean="0">
+              <a:rPr lang="bg-BG" sz="2600" dirty="0">
                 <a:solidFill>
                   <a:schemeClr val="bg2"/>
                 </a:solidFill>
@@ -14653,7 +14956,7 @@
               <a:t>, </a:t>
             </a:r>
             <a:r>
-              <a:rPr lang="bg-BG" sz="2600" b="1" dirty="0" smtClean="0">
+              <a:rPr lang="bg-BG" sz="2600" b="1" dirty="0">
                 <a:solidFill>
                   <a:schemeClr val="bg2"/>
                 </a:solidFill>
@@ -14661,7 +14964,7 @@
               <a:t>рамка</a:t>
             </a:r>
             <a:r>
-              <a:rPr lang="bg-BG" sz="2600" dirty="0" smtClean="0">
+              <a:rPr lang="bg-BG" sz="2600" dirty="0">
                 <a:solidFill>
                   <a:schemeClr val="bg2"/>
                 </a:solidFill>
@@ -14669,7 +14972,7 @@
               <a:t>, </a:t>
             </a:r>
             <a:r>
-              <a:rPr lang="bg-BG" sz="2600" b="1" dirty="0" smtClean="0">
+              <a:rPr lang="bg-BG" sz="2600" b="1" dirty="0">
                 <a:solidFill>
                   <a:schemeClr val="bg2"/>
                 </a:solidFill>
@@ -14677,7 +14980,7 @@
               <a:t>подравняване</a:t>
             </a:r>
             <a:r>
-              <a:rPr lang="en-US" sz="2600" dirty="0" smtClean="0">
+              <a:rPr lang="en-US" sz="2600" dirty="0">
                 <a:solidFill>
                   <a:schemeClr val="bg2"/>
                 </a:solidFill>
@@ -14685,7 +14988,7 @@
               <a:t>,</a:t>
             </a:r>
             <a:r>
-              <a:rPr lang="en-US" sz="2600" b="1" dirty="0" smtClean="0">
+              <a:rPr lang="en-US" sz="2600" b="1" dirty="0">
                 <a:solidFill>
                   <a:schemeClr val="bg2"/>
                 </a:solidFill>
@@ -14693,7 +14996,7 @@
               <a:t> </a:t>
             </a:r>
             <a:r>
-              <a:rPr lang="bg-BG" sz="2600" b="1" dirty="0" smtClean="0">
+              <a:rPr lang="bg-BG" sz="2600" b="1" dirty="0">
                 <a:solidFill>
                   <a:schemeClr val="bg2"/>
                 </a:solidFill>
@@ -14701,7 +15004,7 @@
               <a:t>обединение на клетки</a:t>
             </a:r>
             <a:r>
-              <a:rPr lang="bg-BG" sz="2600" dirty="0" smtClean="0">
+              <a:rPr lang="bg-BG" sz="2600" dirty="0">
                 <a:solidFill>
                   <a:schemeClr val="bg2"/>
                 </a:solidFill>
@@ -14757,7 +15060,7 @@
               <a:t>на числовата </a:t>
             </a:r>
             <a:r>
-              <a:rPr lang="bg-BG" sz="2800" b="1" dirty="0" smtClean="0">
+              <a:rPr lang="bg-BG" sz="2800" b="1" dirty="0">
                 <a:solidFill>
                   <a:schemeClr val="bg2"/>
                 </a:solidFill>
@@ -14778,7 +15081,7 @@
               </a:buClr>
             </a:pPr>
             <a:r>
-              <a:rPr lang="bg-BG" sz="2800" dirty="0" smtClean="0">
+              <a:rPr lang="bg-BG" sz="2800" dirty="0">
                 <a:solidFill>
                   <a:schemeClr val="bg2"/>
                 </a:solidFill>
@@ -14799,7 +15102,7 @@
               </a:buClr>
             </a:pPr>
             <a:r>
-              <a:rPr lang="bg-BG" sz="2600" b="1" dirty="0" smtClean="0">
+              <a:rPr lang="bg-BG" sz="2600" b="1" dirty="0">
                 <a:solidFill>
                   <a:schemeClr val="bg2"/>
                 </a:solidFill>
@@ -14820,7 +15123,7 @@
               </a:buClr>
             </a:pPr>
             <a:r>
-              <a:rPr lang="bg-BG" sz="2600" b="1" dirty="0" smtClean="0">
+              <a:rPr lang="bg-BG" sz="2600" b="1" dirty="0">
                 <a:solidFill>
                   <a:schemeClr val="bg2"/>
                 </a:solidFill>
@@ -14841,18 +15144,13 @@
               </a:buClr>
             </a:pPr>
             <a:r>
-              <a:rPr lang="bg-BG" sz="2600" b="1" dirty="0" smtClean="0">
+              <a:rPr lang="bg-BG" sz="2600" b="1" dirty="0">
                 <a:solidFill>
                   <a:schemeClr val="bg2"/>
                 </a:solidFill>
               </a:rPr>
               <a:t>Кръгова</a:t>
             </a:r>
-            <a:endParaRPr lang="bg-BG" sz="2600" b="1" dirty="0">
-              <a:solidFill>
-                <a:schemeClr val="bg2"/>
-              </a:solidFill>
-            </a:endParaRPr>
           </a:p>
           <a:p>
             <a:pPr marL="0" indent="0">
@@ -15264,7 +15562,7 @@
                 <a:hlinkClick r:id="rId3">
                   <a:extLst>
                     <a:ext uri="{A12FA001-AC4F-418D-AE19-62706E023703}">
-                      <ahyp:hlinkClr xmlns="" xmlns:ahyp="http://schemas.microsoft.com/office/drawing/2018/hyperlinkcolor" val="tx"/>
+                      <ahyp:hlinkClr xmlns:ahyp="http://schemas.microsoft.com/office/drawing/2018/hyperlinkcolor" val="tx"/>
                     </a:ext>
                   </a:extLst>
                 </a:hlinkClick>
@@ -15337,13 +15635,6 @@
       <p:transition spd="slow" advClick="0" advTm="5000"/>
     </mc:Fallback>
   </mc:AlternateContent>
-  <p:timing>
-    <p:tnLst>
-      <p:par>
-        <p:cTn id="1" dur="indefinite" restart="never" nodeType="tmRoot"/>
-      </p:par>
-    </p:tnLst>
-  </p:timing>
 </p:sld>
 </file>
 
@@ -15769,17 +16060,12 @@
           <a:p>
             <a:r>
               <a:rPr lang="bg-BG" dirty="0"/>
-              <a:t>͏Форматиране </a:t>
-            </a:r>
-            <a:r>
-              <a:rPr lang="bg-BG" dirty="0" smtClean="0"/>
-              <a:t>в </a:t>
-            </a:r>
-            <a:r>
-              <a:rPr lang="en-US" dirty="0" smtClean="0"/>
+              <a:t>͏Форматиране в </a:t>
+            </a:r>
+            <a:r>
+              <a:rPr lang="en-US" dirty="0"/>
               <a:t>Excel</a:t>
             </a:r>
-            <a:endParaRPr lang="en-US" dirty="0"/>
           </a:p>
         </p:txBody>
       </p:sp>
@@ -15837,12 +16123,19 @@
         </p:blipFill>
         <p:spPr>
           <a:xfrm>
-            <a:off x="4866690" y="1989000"/>
-            <a:ext cx="2458620" cy="1370550"/>
+            <a:off x="3577374" y="1269000"/>
+            <a:ext cx="5037252" cy="2808000"/>
           </a:xfrm>
           <a:prstGeom prst="rect">
             <a:avLst/>
           </a:prstGeom>
+          <a:ln>
+            <a:solidFill>
+              <a:schemeClr val="bg2">
+                <a:lumMod val="75000"/>
+              </a:schemeClr>
+            </a:solidFill>
+          </a:ln>
         </p:spPr>
       </p:pic>
       <p:pic>
@@ -15867,7 +16160,7 @@
         </p:blipFill>
         <p:spPr>
           <a:xfrm>
-            <a:off x="5916000" y="1584000"/>
+            <a:off x="5736000" y="1539000"/>
             <a:ext cx="1234371" cy="1233000"/>
           </a:xfrm>
           <a:prstGeom prst="rect">
@@ -15893,13 +16186,6 @@
       <p:transition spd="slow" advClick="0" advTm="5000"/>
     </mc:Fallback>
   </mc:AlternateContent>
-  <p:timing>
-    <p:tnLst>
-      <p:par>
-        <p:cTn id="1" dur="indefinite" restart="never" nodeType="tmRoot"/>
-      </p:par>
-    </p:tnLst>
-  </p:timing>
 </p:sld>
 </file>
 
@@ -15942,12 +16228,25 @@
           </a:bodyPr>
           <a:lstStyle/>
           <a:p>
-            <a:r>
-              <a:rPr lang="bg-BG" dirty="0" smtClean="0"/>
-              <a:t>Външният вид на данните се задава от панела </a:t>
-            </a:r>
-            <a:r>
-              <a:rPr lang="en-US" b="1" dirty="0" smtClean="0">
+            <a:pPr>
+              <a:buClr>
+                <a:schemeClr val="tx1"/>
+              </a:buClr>
+            </a:pPr>
+            <a:r>
+              <a:rPr lang="bg-BG" b="1" dirty="0">
+                <a:solidFill>
+                  <a:schemeClr val="bg1"/>
+                </a:solidFill>
+              </a:rPr>
+              <a:t>Стилизация на данните</a:t>
+            </a:r>
+            <a:r>
+              <a:rPr lang="bg-BG" dirty="0"/>
+              <a:t> се задава от панела </a:t>
+            </a:r>
+            <a:r>
+              <a:rPr lang="en-US" b="1" dirty="0">
                 <a:solidFill>
                   <a:schemeClr val="bg1"/>
                 </a:solidFill>
@@ -15955,14 +16254,14 @@
               <a:t>Font</a:t>
             </a:r>
             <a:r>
-              <a:rPr lang="bg-BG" dirty="0" smtClean="0"/>
+              <a:rPr lang="bg-BG" dirty="0"/>
               <a:t>, също както и при </a:t>
             </a:r>
             <a:r>
-              <a:rPr lang="en-US" dirty="0" smtClean="0"/>
+              <a:rPr lang="en-US" dirty="0"/>
               <a:t>MS Word</a:t>
             </a:r>
-            <a:endParaRPr lang="bg-BG" dirty="0" smtClean="0"/>
+            <a:endParaRPr lang="bg-BG" dirty="0"/>
           </a:p>
         </p:txBody>
       </p:sp>
@@ -15982,8 +16281,8 @@
           <a:lstStyle/>
           <a:p>
             <a:r>
-              <a:rPr lang="bg-BG" dirty="0" smtClean="0"/>
-              <a:t>Външен вид на данни</a:t>
+              <a:rPr lang="bg-BG" dirty="0"/>
+              <a:t>Стилизация (външен вид) на данни</a:t>
             </a:r>
             <a:endParaRPr lang="en-US" dirty="0"/>
           </a:p>
@@ -16016,6 +16315,13 @@
           <a:prstGeom prst="rect">
             <a:avLst/>
           </a:prstGeom>
+          <a:ln>
+            <a:solidFill>
+              <a:schemeClr val="bg2">
+                <a:lumMod val="75000"/>
+              </a:schemeClr>
+            </a:solidFill>
+          </a:ln>
         </p:spPr>
       </p:pic>
       <p:sp>
@@ -16078,7 +16384,7 @@
           <a:p>
             <a:pPr algn="ctr"/>
             <a:r>
-              <a:rPr lang="bg-BG" sz="2800" b="1" dirty="0" smtClean="0">
+              <a:rPr lang="bg-BG" sz="2800" b="1" dirty="0">
                 <a:solidFill>
                   <a:srgbClr val="FFFFFF"/>
                 </a:solidFill>
@@ -16167,7 +16473,7 @@
           <a:p>
             <a:pPr algn="ctr"/>
             <a:r>
-              <a:rPr lang="bg-BG" sz="2800" b="1" dirty="0" smtClean="0">
+              <a:rPr lang="bg-BG" sz="2800" b="1" dirty="0">
                 <a:solidFill>
                   <a:srgbClr val="FFFFFF"/>
                 </a:solidFill>
@@ -16256,7 +16562,7 @@
           <a:p>
             <a:pPr algn="ctr"/>
             <a:r>
-              <a:rPr lang="bg-BG" sz="2800" b="1" dirty="0" smtClean="0">
+              <a:rPr lang="bg-BG" sz="2800" b="1" dirty="0">
                 <a:solidFill>
                   <a:srgbClr val="FFFFFF"/>
                 </a:solidFill>
@@ -16345,7 +16651,7 @@
           <a:p>
             <a:pPr algn="ctr"/>
             <a:r>
-              <a:rPr lang="bg-BG" sz="2800" b="1" dirty="0" smtClean="0">
+              <a:rPr lang="bg-BG" sz="2800" b="1" dirty="0">
                 <a:solidFill>
                   <a:srgbClr val="FFFFFF"/>
                 </a:solidFill>
@@ -16382,8 +16688,8 @@
         </p:nvSpPr>
         <p:spPr bwMode="auto">
           <a:xfrm>
-            <a:off x="8592463" y="3553190"/>
-            <a:ext cx="1980000" cy="990000"/>
+            <a:off x="8592463" y="3429000"/>
+            <a:ext cx="1980000" cy="1114190"/>
           </a:xfrm>
           <a:prstGeom prst="wedgeRoundRectCallout">
             <a:avLst>
@@ -16434,7 +16740,7 @@
           <a:p>
             <a:pPr algn="ctr"/>
             <a:r>
-              <a:rPr lang="bg-BG" sz="2800" b="1" dirty="0" smtClean="0">
+              <a:rPr lang="bg-BG" sz="2800" b="1" dirty="0">
                 <a:solidFill>
                   <a:srgbClr val="FFFFFF"/>
                 </a:solidFill>
@@ -16471,8 +16777,8 @@
         </p:nvSpPr>
         <p:spPr bwMode="auto">
           <a:xfrm>
-            <a:off x="6714231" y="2239291"/>
-            <a:ext cx="1980000" cy="990000"/>
+            <a:off x="6591000" y="2169000"/>
+            <a:ext cx="2103231" cy="1060291"/>
           </a:xfrm>
           <a:prstGeom prst="wedgeRoundRectCallout">
             <a:avLst>
@@ -16523,7 +16829,7 @@
           <a:p>
             <a:pPr algn="ctr"/>
             <a:r>
-              <a:rPr lang="bg-BG" sz="2800" b="1" dirty="0" smtClean="0">
+              <a:rPr lang="bg-BG" sz="2800" b="1" dirty="0">
                 <a:solidFill>
                   <a:srgbClr val="FFFFFF"/>
                 </a:solidFill>
@@ -17430,9 +17736,22 @@
           <a:bodyPr/>
           <a:lstStyle/>
           <a:p>
-            <a:r>
-              <a:rPr lang="bg-BG" dirty="0" smtClean="0"/>
-              <a:t>Рамка се поставя с:</a:t>
+            <a:pPr>
+              <a:buClr>
+                <a:schemeClr val="tx1"/>
+              </a:buClr>
+            </a:pPr>
+            <a:r>
+              <a:rPr lang="bg-BG" b="1" dirty="0">
+                <a:solidFill>
+                  <a:schemeClr val="bg1"/>
+                </a:solidFill>
+              </a:rPr>
+              <a:t>Рамка</a:t>
+            </a:r>
+            <a:r>
+              <a:rPr lang="bg-BG" dirty="0"/>
+              <a:t> се поставя с:</a:t>
             </a:r>
           </a:p>
           <a:p>
@@ -17442,31 +17761,31 @@
               </a:spcAft>
             </a:pPr>
             <a:r>
-              <a:rPr lang="en-US" b="1" dirty="0" smtClean="0"/>
+              <a:rPr lang="en-US" b="1" dirty="0"/>
               <a:t>Draw Border </a:t>
             </a:r>
             <a:r>
-              <a:rPr lang="en-US" dirty="0" smtClean="0"/>
+              <a:rPr lang="en-US" dirty="0"/>
               <a:t>– </a:t>
             </a:r>
             <a:r>
-              <a:rPr lang="bg-BG" dirty="0" smtClean="0"/>
+              <a:rPr lang="bg-BG" dirty="0"/>
               <a:t>сами </a:t>
             </a:r>
             <a:r>
-              <a:rPr lang="bg-BG" b="1" dirty="0" smtClean="0"/>
+              <a:rPr lang="bg-BG" b="1" dirty="0"/>
               <a:t>очертавате</a:t>
             </a:r>
             <a:r>
-              <a:rPr lang="bg-BG" dirty="0" smtClean="0"/>
+              <a:rPr lang="bg-BG" dirty="0"/>
               <a:t> </a:t>
             </a:r>
             <a:r>
-              <a:rPr lang="bg-BG" b="1" dirty="0" smtClean="0"/>
+              <a:rPr lang="bg-BG" b="1" dirty="0"/>
               <a:t>областта</a:t>
             </a:r>
             <a:r>
-              <a:rPr lang="bg-BG" dirty="0" smtClean="0"/>
+              <a:rPr lang="bg-BG" dirty="0"/>
               <a:t>, около която искате да има рамка</a:t>
             </a:r>
           </a:p>
@@ -17477,19 +17796,19 @@
               </a:spcAft>
             </a:pPr>
             <a:r>
-              <a:rPr lang="en-US" b="1" dirty="0" smtClean="0"/>
+              <a:rPr lang="en-US" b="1" dirty="0"/>
               <a:t>Draw Border Grid </a:t>
             </a:r>
             <a:r>
-              <a:rPr lang="en-US" dirty="0" smtClean="0"/>
+              <a:rPr lang="en-US" dirty="0"/>
               <a:t>– </a:t>
             </a:r>
             <a:r>
-              <a:rPr lang="bg-BG" dirty="0" smtClean="0"/>
+              <a:rPr lang="bg-BG" dirty="0"/>
               <a:t>изчертава рамка около всяка </a:t>
             </a:r>
             <a:r>
-              <a:rPr lang="bg-BG" b="1" dirty="0" smtClean="0"/>
+              <a:rPr lang="bg-BG" b="1" dirty="0"/>
               <a:t>маркирана клетка </a:t>
             </a:r>
           </a:p>
@@ -17500,30 +17819,25 @@
               </a:spcAft>
             </a:pPr>
             <a:r>
-              <a:rPr lang="en-US" b="1" dirty="0" smtClean="0"/>
+              <a:rPr lang="en-US" b="1" dirty="0"/>
               <a:t>More Borders </a:t>
             </a:r>
             <a:r>
-              <a:rPr lang="bg-BG" dirty="0" smtClean="0"/>
+              <a:rPr lang="bg-BG" dirty="0"/>
               <a:t>– отваря </a:t>
             </a:r>
             <a:r>
-              <a:rPr lang="bg-BG" b="1" dirty="0" smtClean="0"/>
+              <a:rPr lang="bg-BG" b="1" dirty="0"/>
               <a:t>диалогов прозорец </a:t>
             </a:r>
             <a:r>
-              <a:rPr lang="en-US" b="1" dirty="0" smtClean="0">
+              <a:rPr lang="en-US" b="1" dirty="0">
                 <a:solidFill>
                   <a:schemeClr val="bg1"/>
                 </a:solidFill>
               </a:rPr>
               <a:t>Format Cells</a:t>
             </a:r>
-            <a:endParaRPr lang="en-US" b="1" dirty="0">
-              <a:solidFill>
-                <a:schemeClr val="bg1"/>
-              </a:solidFill>
-            </a:endParaRPr>
           </a:p>
         </p:txBody>
       </p:sp>
@@ -17543,7 +17857,7 @@
           <a:lstStyle/>
           <a:p>
             <a:r>
-              <a:rPr lang="bg-BG" dirty="0" smtClean="0"/>
+              <a:rPr lang="bg-BG" dirty="0"/>
               <a:t>Рамка на клетка</a:t>
             </a:r>
             <a:endParaRPr lang="en-US" dirty="0"/>
@@ -17757,17 +18071,12 @@
           <a:p>
             <a:r>
               <a:rPr lang="bg-BG" dirty="0"/>
-              <a:t>Рамка на </a:t>
-            </a:r>
-            <a:r>
-              <a:rPr lang="bg-BG" dirty="0" smtClean="0"/>
-              <a:t>клетка</a:t>
-            </a:r>
-            <a:r>
-              <a:rPr lang="en-US" dirty="0" smtClean="0"/>
+              <a:t>Рамка на клетка</a:t>
+            </a:r>
+            <a:r>
+              <a:rPr lang="en-US" dirty="0"/>
               <a:t> – More Borders</a:t>
             </a:r>
-            <a:endParaRPr lang="en-US" dirty="0"/>
           </a:p>
         </p:txBody>
       </p:sp>
@@ -18261,8 +18570,8 @@
         </p:nvSpPr>
         <p:spPr bwMode="auto">
           <a:xfrm>
-            <a:off x="629191" y="1539001"/>
-            <a:ext cx="2925000" cy="720000"/>
+            <a:off x="541206" y="1539001"/>
+            <a:ext cx="3012985" cy="720000"/>
           </a:xfrm>
           <a:prstGeom prst="wedgeRoundRectCallout">
             <a:avLst>
@@ -18313,7 +18622,7 @@
           <a:p>
             <a:pPr algn="ctr"/>
             <a:r>
-              <a:rPr lang="bg-BG" sz="2800" b="1" dirty="0" smtClean="0">
+              <a:rPr lang="bg-BG" sz="2800" b="1" dirty="0">
                 <a:solidFill>
                   <a:srgbClr val="FFFFFF"/>
                 </a:solidFill>
@@ -18350,8 +18659,8 @@
         </p:nvSpPr>
         <p:spPr bwMode="auto">
           <a:xfrm>
-            <a:off x="613745" y="3702486"/>
-            <a:ext cx="2925000" cy="705090"/>
+            <a:off x="525760" y="3702486"/>
+            <a:ext cx="3012985" cy="705090"/>
           </a:xfrm>
           <a:prstGeom prst="wedgeRoundRectCallout">
             <a:avLst>
@@ -18402,7 +18711,7 @@
           <a:p>
             <a:pPr algn="ctr"/>
             <a:r>
-              <a:rPr lang="bg-BG" sz="2800" b="1" dirty="0" smtClean="0">
+              <a:rPr lang="bg-BG" sz="2800" b="1" dirty="0">
                 <a:solidFill>
                   <a:srgbClr val="FFFFFF"/>
                 </a:solidFill>
@@ -18440,7 +18749,7 @@
         <p:spPr bwMode="auto">
           <a:xfrm>
             <a:off x="7941000" y="1637855"/>
-            <a:ext cx="3052144" cy="705090"/>
+            <a:ext cx="3195000" cy="705090"/>
           </a:xfrm>
           <a:prstGeom prst="wedgeRoundRectCallout">
             <a:avLst>
@@ -18491,7 +18800,7 @@
           <a:p>
             <a:pPr algn="ctr"/>
             <a:r>
-              <a:rPr lang="bg-BG" sz="2800" b="1" dirty="0" smtClean="0">
+              <a:rPr lang="bg-BG" sz="2800" b="1" dirty="0">
                 <a:solidFill>
                   <a:srgbClr val="FFFFFF"/>
                 </a:solidFill>
@@ -18908,19 +19217,11 @@
           <a:lstStyle/>
           <a:p>
             <a:r>
-              <a:rPr lang="bg-BG" dirty="0" smtClean="0"/>
-              <a:t>Разположението на данните </a:t>
-            </a:r>
-            <a:r>
               <a:rPr lang="bg-BG" dirty="0"/>
-              <a:t>се задава от </a:t>
-            </a:r>
-            <a:r>
-              <a:rPr lang="bg-BG" dirty="0" smtClean="0"/>
-              <a:t>панела </a:t>
-            </a:r>
-            <a:r>
-              <a:rPr lang="en-US" b="1" dirty="0" smtClean="0">
+              <a:t>Разположението на данните се задава от панела </a:t>
+            </a:r>
+            <a:r>
+              <a:rPr lang="en-US" b="1" dirty="0">
                 <a:solidFill>
                   <a:schemeClr val="bg1"/>
                 </a:solidFill>
@@ -18947,7 +19248,7 @@
           <a:lstStyle/>
           <a:p>
             <a:r>
-              <a:rPr lang="bg-BG" dirty="0" smtClean="0"/>
+              <a:rPr lang="bg-BG" dirty="0"/>
               <a:t>Разположение на данни в клетките</a:t>
             </a:r>
             <a:endParaRPr lang="en-US" dirty="0"/>
@@ -18982,6 +19283,13 @@
           <a:prstGeom prst="rect">
             <a:avLst/>
           </a:prstGeom>
+          <a:ln>
+            <a:solidFill>
+              <a:schemeClr val="bg2">
+                <a:lumMod val="75000"/>
+              </a:schemeClr>
+            </a:solidFill>
+          </a:ln>
         </p:spPr>
       </p:pic>
       <p:sp>
@@ -19110,7 +19418,7 @@
           <a:p>
             <a:pPr algn="ctr"/>
             <a:r>
-              <a:rPr lang="bg-BG" sz="2800" b="1" dirty="0" smtClean="0">
+              <a:rPr lang="bg-BG" sz="2800" b="1" dirty="0">
                 <a:solidFill>
                   <a:srgbClr val="FFFFFF"/>
                 </a:solidFill>
@@ -19265,21 +19573,6 @@
           <a:p>
             <a:pPr algn="ctr"/>
             <a:r>
-              <a:rPr lang="bg-BG" sz="2800" b="1" dirty="0" smtClean="0">
-                <a:solidFill>
-                  <a:srgbClr val="FFFFFF"/>
-                </a:solidFill>
-                <a:effectLst>
-                  <a:outerShdw blurRad="38100" dist="38100" dir="2700000" algn="tl">
-                    <a:srgbClr val="000000">
-                      <a:alpha val="43137"/>
-                    </a:srgbClr>
-                  </a:outerShdw>
-                </a:effectLst>
-              </a:rPr>
-              <a:t>Хоризонтално</a:t>
-            </a:r>
-            <a:r>
               <a:rPr lang="bg-BG" sz="2800" b="1" dirty="0">
                 <a:solidFill>
                   <a:srgbClr val="FFFFFF"/>
@@ -19292,22 +19585,7 @@
                   </a:outerShdw>
                 </a:effectLst>
               </a:rPr>
-              <a:t> </a:t>
-            </a:r>
-            <a:r>
-              <a:rPr lang="bg-BG" sz="2800" b="1" dirty="0" smtClean="0">
-                <a:solidFill>
-                  <a:srgbClr val="FFFFFF"/>
-                </a:solidFill>
-                <a:effectLst>
-                  <a:outerShdw blurRad="38100" dist="38100" dir="2700000" algn="tl">
-                    <a:srgbClr val="000000">
-                      <a:alpha val="43137"/>
-                    </a:srgbClr>
-                  </a:outerShdw>
-                </a:effectLst>
-              </a:rPr>
-              <a:t>подравняване</a:t>
+              <a:t>Хоризонтално подравняване</a:t>
             </a:r>
           </a:p>
         </p:txBody>
@@ -19325,8 +19603,8 @@
           </a:xfrm>
           <a:prstGeom prst="wedgeRoundRectCallout">
             <a:avLst>
-              <a:gd name="adj1" fmla="val -89447"/>
-              <a:gd name="adj2" fmla="val 84007"/>
+              <a:gd name="adj1" fmla="val -100564"/>
+              <a:gd name="adj2" fmla="val 79364"/>
               <a:gd name="adj3" fmla="val 16667"/>
             </a:avLst>
           </a:prstGeom>
@@ -19372,7 +19650,7 @@
           <a:p>
             <a:pPr algn="ctr"/>
             <a:r>
-              <a:rPr lang="bg-BG" sz="2800" b="1" dirty="0" smtClean="0">
+              <a:rPr lang="bg-BG" sz="2800" b="1" dirty="0">
                 <a:solidFill>
                   <a:srgbClr val="FFFFFF"/>
                 </a:solidFill>
@@ -19461,7 +19739,7 @@
           <a:p>
             <a:pPr algn="ctr"/>
             <a:r>
-              <a:rPr lang="bg-BG" sz="2800" b="1" dirty="0" smtClean="0">
+              <a:rPr lang="bg-BG" sz="2800" b="1" dirty="0">
                 <a:solidFill>
                   <a:srgbClr val="FFFFFF"/>
                 </a:solidFill>
@@ -19550,7 +19828,7 @@
           <a:p>
             <a:pPr algn="ctr"/>
             <a:r>
-              <a:rPr lang="bg-BG" sz="2800" b="1" dirty="0" smtClean="0">
+              <a:rPr lang="bg-BG" sz="2800" b="1" dirty="0">
                 <a:solidFill>
                   <a:srgbClr val="FFFFFF"/>
                 </a:solidFill>
@@ -20468,7 +20746,7 @@
           <a:lstStyle/>
           <a:p>
             <a:r>
-              <a:rPr lang="bg-BG" dirty="0" smtClean="0"/>
+              <a:rPr lang="bg-BG" dirty="0"/>
               <a:t>Форматиране на подравняване на клетки</a:t>
             </a:r>
             <a:endParaRPr lang="en-US" dirty="0"/>
@@ -20630,8 +20908,8 @@
         </p:nvSpPr>
         <p:spPr bwMode="auto">
           <a:xfrm>
-            <a:off x="1169054" y="1369891"/>
-            <a:ext cx="2541946" cy="990000"/>
+            <a:off x="1146000" y="1369891"/>
+            <a:ext cx="2565000" cy="990000"/>
           </a:xfrm>
           <a:prstGeom prst="wedgeRoundRectCallout">
             <a:avLst>
@@ -20682,7 +20960,7 @@
           <a:p>
             <a:pPr algn="ctr"/>
             <a:r>
-              <a:rPr lang="bg-BG" sz="2800" b="1" dirty="0" smtClean="0">
+              <a:rPr lang="bg-BG" sz="2800" b="1" dirty="0">
                 <a:solidFill>
                   <a:srgbClr val="FFFFFF"/>
                 </a:solidFill>
@@ -20903,7 +21181,7 @@
           <a:p>
             <a:pPr algn="ctr"/>
             <a:r>
-              <a:rPr lang="bg-BG" sz="2800" b="1" dirty="0" smtClean="0">
+              <a:rPr lang="bg-BG" sz="2800" b="1" dirty="0">
                 <a:solidFill>
                   <a:srgbClr val="FFFFFF"/>
                 </a:solidFill>
@@ -20992,7 +21270,7 @@
           <a:p>
             <a:pPr algn="ctr"/>
             <a:r>
-              <a:rPr lang="bg-BG" sz="2800" b="1" dirty="0" smtClean="0">
+              <a:rPr lang="bg-BG" sz="2800" b="1" dirty="0">
                 <a:solidFill>
                   <a:srgbClr val="FFFFFF"/>
                 </a:solidFill>
@@ -21147,7 +21425,7 @@
           <a:p>
             <a:pPr algn="ctr"/>
             <a:r>
-              <a:rPr lang="bg-BG" sz="2800" b="1" dirty="0" smtClean="0">
+              <a:rPr lang="bg-BG" sz="2800" b="1" dirty="0">
                 <a:solidFill>
                   <a:srgbClr val="FFFFFF"/>
                 </a:solidFill>

</xml_diff>